<commit_message>
made services and followed more clean architecture
</commit_message>
<xml_diff>
--- a/ResortManagementWeb/wwwroot/exports/ExportVillaDetails.pptx
+++ b/ResortManagementWeb/wwwroot/exports/ExportVillaDetails.pptx
@@ -254,7 +254,7 @@
           <a:p>
             <a:fld id="{0B656A9B-1D5C-4773-96DA-59FFF9A0C685}" type="datetimeFigureOut">
               <a:rPr lang="en-US" dirty="0"/>
-              <a:t>4/16/2025</a:t>
+              <a:t>4/17/2025</a:t>
             </a:fld>
             <a:endParaRPr lang="en-US" dirty="0"/>
           </a:p>
@@ -441,7 +441,7 @@
           <a:p>
             <a:fld id="{0B656A9B-1D5C-4773-96DA-59FFF9A0C685}" type="datetimeFigureOut">
               <a:rPr lang="en-US" dirty="0"/>
-              <a:t>4/16/2025</a:t>
+              <a:t>4/17/2025</a:t>
             </a:fld>
             <a:endParaRPr lang="en-US" dirty="0"/>
           </a:p>
@@ -636,7 +636,7 @@
           <a:p>
             <a:fld id="{0B656A9B-1D5C-4773-96DA-59FFF9A0C685}" type="datetimeFigureOut">
               <a:rPr lang="en-US" dirty="0"/>
-              <a:t>4/16/2025</a:t>
+              <a:t>4/17/2025</a:t>
             </a:fld>
             <a:endParaRPr lang="en-US" dirty="0"/>
           </a:p>
@@ -823,7 +823,7 @@
           <a:p>
             <a:fld id="{0B656A9B-1D5C-4773-96DA-59FFF9A0C685}" type="datetimeFigureOut">
               <a:rPr lang="en-US" dirty="0"/>
-              <a:t>4/16/2025</a:t>
+              <a:t>4/17/2025</a:t>
             </a:fld>
             <a:endParaRPr lang="en-US" dirty="0"/>
           </a:p>
@@ -1085,7 +1085,7 @@
           <a:p>
             <a:fld id="{0B656A9B-1D5C-4773-96DA-59FFF9A0C685}" type="datetimeFigureOut">
               <a:rPr lang="en-US" dirty="0"/>
-              <a:t>4/16/2025</a:t>
+              <a:t>4/17/2025</a:t>
             </a:fld>
             <a:endParaRPr lang="en-US" dirty="0"/>
           </a:p>
@@ -1335,7 +1335,7 @@
           <a:p>
             <a:fld id="{0B656A9B-1D5C-4773-96DA-59FFF9A0C685}" type="datetimeFigureOut">
               <a:rPr lang="en-US" dirty="0"/>
-              <a:t>4/16/2025</a:t>
+              <a:t>4/17/2025</a:t>
             </a:fld>
             <a:endParaRPr lang="en-US" dirty="0"/>
           </a:p>
@@ -1725,7 +1725,7 @@
           <a:p>
             <a:fld id="{0B656A9B-1D5C-4773-96DA-59FFF9A0C685}" type="datetimeFigureOut">
               <a:rPr lang="en-US" dirty="0"/>
-              <a:t>4/16/2025</a:t>
+              <a:t>4/17/2025</a:t>
             </a:fld>
             <a:endParaRPr lang="en-US" dirty="0"/>
           </a:p>
@@ -1857,7 +1857,7 @@
           <a:p>
             <a:fld id="{0B656A9B-1D5C-4773-96DA-59FFF9A0C685}" type="datetimeFigureOut">
               <a:rPr lang="en-US" dirty="0"/>
-              <a:t>4/16/2025</a:t>
+              <a:t>4/17/2025</a:t>
             </a:fld>
             <a:endParaRPr lang="en-US" dirty="0"/>
           </a:p>
@@ -1962,7 +1962,7 @@
           <a:p>
             <a:fld id="{0B656A9B-1D5C-4773-96DA-59FFF9A0C685}" type="datetimeFigureOut">
               <a:rPr lang="en-US" dirty="0"/>
-              <a:t>4/16/2025</a:t>
+              <a:t>4/17/2025</a:t>
             </a:fld>
             <a:endParaRPr lang="en-US" dirty="0"/>
           </a:p>
@@ -2257,7 +2257,7 @@
           <a:p>
             <a:fld id="{0B656A9B-1D5C-4773-96DA-59FFF9A0C685}" type="datetimeFigureOut">
               <a:rPr lang="en-US" dirty="0"/>
-              <a:t>4/16/2025</a:t>
+              <a:t>4/17/2025</a:t>
             </a:fld>
             <a:endParaRPr lang="en-US" dirty="0"/>
           </a:p>
@@ -2530,7 +2530,7 @@
           <a:p>
             <a:fld id="{0B656A9B-1D5C-4773-96DA-59FFF9A0C685}" type="datetimeFigureOut">
               <a:rPr lang="en-US" dirty="0"/>
-              <a:t>4/16/2025</a:t>
+              <a:t>4/17/2025</a:t>
             </a:fld>
             <a:endParaRPr lang="en-US" dirty="0"/>
           </a:p>
@@ -2760,7 +2760,7 @@
           <a:p>
             <a:fld id="{0B656A9B-1D5C-4773-96DA-59FFF9A0C685}" type="datetimeFigureOut">
               <a:rPr lang="en-US" dirty="0"/>
-              <a:t>4/16/2025</a:t>
+              <a:t>4/17/2025</a:t>
             </a:fld>
             <a:endParaRPr lang="en-US" dirty="0"/>
           </a:p>
@@ -3529,7 +3529,7 @@
                   <a:srgbClr val="00B050"/>
                 </a:solidFill>
               </a:rPr>
-              <a:t>Resort Management System</a:t>
+              <a:t>Shivalaya</a:t>
             </a:r>
             <a:endParaRPr lang="en-US" sz="3200" dirty="0">
               <a:solidFill>

</xml_diff>